<commit_message>
Update presentations and modify data in andrisErkezes.txt
</commit_message>
<xml_diff>
--- a/Boosting Algoritmusok.pptx
+++ b/Boosting Algoritmusok.pptx
@@ -5,7 +5,7 @@
     <p:sldMasterId id="2147483659" r:id="rId1"/>
   </p:sldMasterIdLst>
   <p:notesMasterIdLst>
-    <p:notesMasterId r:id="rId9"/>
+    <p:notesMasterId r:id="rId10"/>
   </p:notesMasterIdLst>
   <p:sldIdLst>
     <p:sldId id="256" r:id="rId2"/>
@@ -14,20 +14,21 @@
     <p:sldId id="260" r:id="rId5"/>
     <p:sldId id="265" r:id="rId6"/>
     <p:sldId id="261" r:id="rId7"/>
-    <p:sldId id="264" r:id="rId8"/>
+    <p:sldId id="266" r:id="rId8"/>
+    <p:sldId id="264" r:id="rId9"/>
   </p:sldIdLst>
   <p:sldSz cx="12192000" cy="6858000"/>
   <p:notesSz cx="6858000" cy="9144000"/>
   <p:embeddedFontLst>
     <p:embeddedFont>
       <p:font typeface="Outfit" panose="020B0604020202020204" charset="0"/>
-      <p:regular r:id="rId10"/>
-      <p:bold r:id="rId11"/>
+      <p:regular r:id="rId11"/>
+      <p:bold r:id="rId12"/>
     </p:embeddedFont>
     <p:embeddedFont>
       <p:font typeface="Space Grotesk" panose="020B0604020202020204" charset="-18"/>
-      <p:regular r:id="rId12"/>
-      <p:bold r:id="rId13"/>
+      <p:regular r:id="rId13"/>
+      <p:bold r:id="rId14"/>
     </p:embeddedFont>
   </p:embeddedFontLst>
   <p:defaultTextStyle>
@@ -1416,6 +1417,122 @@
 </file>
 
 <file path=ppt/notesSlides/notesSlide7.xml><?xml version="1.0" encoding="utf-8"?>
+<p:notes xmlns:a="http://schemas.openxmlformats.org/drawingml/2006/main" xmlns:r="http://schemas.openxmlformats.org/officeDocument/2006/relationships" xmlns:p="http://schemas.openxmlformats.org/presentationml/2006/main" showMasterSp="0" showMasterPhAnim="0">
+  <p:cSld>
+    <p:spTree>
+      <p:nvGrpSpPr>
+        <p:cNvPr id="1" name="Shape 146"/>
+        <p:cNvGrpSpPr/>
+        <p:nvPr/>
+      </p:nvGrpSpPr>
+      <p:grpSpPr>
+        <a:xfrm>
+          <a:off x="0" y="0"/>
+          <a:ext cx="0" cy="0"/>
+          <a:chOff x="0" y="0"/>
+          <a:chExt cx="0" cy="0"/>
+        </a:xfrm>
+      </p:grpSpPr>
+      <p:sp>
+        <p:nvSpPr>
+          <p:cNvPr id="147" name="Google Shape;147;p6:notes"/>
+          <p:cNvSpPr txBox="1">
+            <a:spLocks noGrp="1"/>
+          </p:cNvSpPr>
+          <p:nvPr>
+            <p:ph type="body" idx="1"/>
+          </p:nvPr>
+        </p:nvSpPr>
+        <p:spPr>
+          <a:xfrm>
+            <a:off x="685800" y="4343400"/>
+            <a:ext cx="5486400" cy="4114800"/>
+          </a:xfrm>
+          <a:prstGeom prst="rect">
+            <a:avLst/>
+          </a:prstGeom>
+        </p:spPr>
+        <p:txBody>
+          <a:bodyPr spcFirstLastPara="1" wrap="square" lIns="91425" tIns="91425" rIns="91425" bIns="91425" anchor="t" anchorCtr="0">
+            <a:noAutofit/>
+          </a:bodyPr>
+          <a:lstStyle/>
+          <a:p>
+            <a:pPr marL="0" lvl="0" indent="0" algn="l" rtl="0">
+              <a:spcBef>
+                <a:spcPts val="0"/>
+              </a:spcBef>
+              <a:spcAft>
+                <a:spcPts val="0"/>
+              </a:spcAft>
+              <a:buNone/>
+            </a:pPr>
+            <a:endParaRPr dirty="0"/>
+          </a:p>
+        </p:txBody>
+      </p:sp>
+      <p:sp>
+        <p:nvSpPr>
+          <p:cNvPr id="148" name="Google Shape;148;p6:notes"/>
+          <p:cNvSpPr>
+            <a:spLocks noGrp="1" noRot="1" noChangeAspect="1"/>
+          </p:cNvSpPr>
+          <p:nvPr>
+            <p:ph type="sldImg" idx="2"/>
+          </p:nvPr>
+        </p:nvSpPr>
+        <p:spPr>
+          <a:xfrm>
+            <a:off x="381000" y="685800"/>
+            <a:ext cx="6096000" cy="3429000"/>
+          </a:xfrm>
+          <a:custGeom>
+            <a:avLst/>
+            <a:gdLst/>
+            <a:ahLst/>
+            <a:cxnLst/>
+            <a:rect l="l" t="t" r="r" b="b"/>
+            <a:pathLst>
+              <a:path w="120000" h="120000" extrusionOk="0">
+                <a:moveTo>
+                  <a:pt x="0" y="0"/>
+                </a:moveTo>
+                <a:lnTo>
+                  <a:pt x="120000" y="0"/>
+                </a:lnTo>
+                <a:lnTo>
+                  <a:pt x="120000" y="120000"/>
+                </a:lnTo>
+                <a:lnTo>
+                  <a:pt x="0" y="120000"/>
+                </a:lnTo>
+                <a:close/>
+              </a:path>
+            </a:pathLst>
+          </a:custGeom>
+        </p:spPr>
+        <p:txBody>
+          <a:bodyPr/>
+          <a:lstStyle/>
+          <a:p>
+            <a:endParaRPr lang="hu-HU"/>
+          </a:p>
+        </p:txBody>
+      </p:sp>
+    </p:spTree>
+    <p:extLst>
+      <p:ext uri="{BB962C8B-B14F-4D97-AF65-F5344CB8AC3E}">
+        <p14:creationId xmlns:p14="http://schemas.microsoft.com/office/powerpoint/2010/main" val="344059107"/>
+      </p:ext>
+    </p:extLst>
+  </p:cSld>
+  <p:clrMapOvr>
+    <a:masterClrMapping/>
+  </p:clrMapOvr>
+</p:notes>
+</file>
+
+<file path=ppt/notesSlides/notesSlide8.xml><?xml version="1.0" encoding="utf-8"?>
 <p:notes xmlns:a="http://schemas.openxmlformats.org/drawingml/2006/main" xmlns:r="http://schemas.openxmlformats.org/officeDocument/2006/relationships" xmlns:p="http://schemas.openxmlformats.org/presentationml/2006/main" showMasterSp="0" showMasterPhAnim="0">
   <p:cSld>
     <p:spTree>
@@ -13326,6 +13443,123 @@
     </p:bg>
     <p:spTree>
       <p:nvGrpSpPr>
+        <p:cNvPr id="1" name="Shape 149"/>
+        <p:cNvGrpSpPr/>
+        <p:nvPr/>
+      </p:nvGrpSpPr>
+      <p:grpSpPr>
+        <a:xfrm>
+          <a:off x="0" y="0"/>
+          <a:ext cx="0" cy="0"/>
+          <a:chOff x="0" y="0"/>
+          <a:chExt cx="0" cy="0"/>
+        </a:xfrm>
+      </p:grpSpPr>
+      <p:pic>
+        <p:nvPicPr>
+          <p:cNvPr id="150" name="Google Shape;150;p18" descr="image.png"/>
+          <p:cNvPicPr preferRelativeResize="0"/>
+          <p:nvPr/>
+        </p:nvPicPr>
+        <p:blipFill rotWithShape="1">
+          <a:blip r:embed="rId3">
+            <a:alphaModFix/>
+          </a:blip>
+          <a:srcRect/>
+          <a:stretch/>
+        </p:blipFill>
+        <p:spPr>
+          <a:xfrm>
+            <a:off x="0" y="0"/>
+            <a:ext cx="12192000" cy="6858000"/>
+          </a:xfrm>
+          <a:prstGeom prst="rect">
+            <a:avLst/>
+          </a:prstGeom>
+          <a:noFill/>
+          <a:ln>
+            <a:noFill/>
+          </a:ln>
+        </p:spPr>
+      </p:pic>
+      <p:sp>
+        <p:nvSpPr>
+          <p:cNvPr id="153" name="Google Shape;153;p18"/>
+          <p:cNvSpPr txBox="1"/>
+          <p:nvPr/>
+        </p:nvSpPr>
+        <p:spPr>
+          <a:xfrm>
+            <a:off x="3087559" y="2950599"/>
+            <a:ext cx="6016881" cy="677108"/>
+          </a:xfrm>
+          <a:prstGeom prst="rect">
+            <a:avLst/>
+          </a:prstGeom>
+          <a:noFill/>
+          <a:ln>
+            <a:noFill/>
+          </a:ln>
+        </p:spPr>
+        <p:txBody>
+          <a:bodyPr spcFirstLastPara="1" wrap="square" lIns="0" tIns="0" rIns="0" bIns="0" anchor="t" anchorCtr="0">
+            <a:spAutoFit/>
+          </a:bodyPr>
+          <a:lstStyle/>
+          <a:p>
+            <a:pPr marL="0" marR="0" lvl="0" indent="0" algn="l" rtl="0">
+              <a:lnSpc>
+                <a:spcPct val="109972"/>
+              </a:lnSpc>
+              <a:spcBef>
+                <a:spcPts val="0"/>
+              </a:spcBef>
+              <a:spcAft>
+                <a:spcPts val="0"/>
+              </a:spcAft>
+              <a:buNone/>
+            </a:pPr>
+            <a:r>
+              <a:rPr lang="hu-HU" sz="4000" b="1" dirty="0">
+                <a:solidFill>
+                  <a:srgbClr val="38BDF8"/>
+                </a:solidFill>
+                <a:latin typeface="Space Grotesk"/>
+                <a:cs typeface="Space Grotesk"/>
+                <a:sym typeface="Space Grotesk"/>
+              </a:rPr>
+              <a:t>Köszönjük a figyelmet!</a:t>
+            </a:r>
+            <a:endParaRPr sz="1600" dirty="0"/>
+          </a:p>
+        </p:txBody>
+      </p:sp>
+    </p:spTree>
+    <p:extLst>
+      <p:ext uri="{BB962C8B-B14F-4D97-AF65-F5344CB8AC3E}">
+        <p14:creationId xmlns:p14="http://schemas.microsoft.com/office/powerpoint/2010/main" val="753118891"/>
+      </p:ext>
+    </p:extLst>
+  </p:cSld>
+  <p:clrMapOvr>
+    <a:masterClrMapping/>
+  </p:clrMapOvr>
+</p:sld>
+</file>
+
+<file path=ppt/slides/slide8.xml><?xml version="1.0" encoding="utf-8"?>
+<p:sld xmlns:a="http://schemas.openxmlformats.org/drawingml/2006/main" xmlns:r="http://schemas.openxmlformats.org/officeDocument/2006/relationships" xmlns:p="http://schemas.openxmlformats.org/presentationml/2006/main">
+  <p:cSld>
+    <p:bg>
+      <p:bgPr>
+        <a:solidFill>
+          <a:srgbClr val="1E293B"/>
+        </a:solidFill>
+        <a:effectLst/>
+      </p:bgPr>
+    </p:bg>
+    <p:spTree>
+      <p:nvGrpSpPr>
         <p:cNvPr id="1" name="Shape 180"/>
         <p:cNvGrpSpPr/>
         <p:nvPr/>

</xml_diff>